<commit_message>
fix a few errors...
</commit_message>
<xml_diff>
--- a/classes/so2015/quantReview_DD.pptx
+++ b/classes/so2015/quantReview_DD.pptx
@@ -300,7 +300,7 @@
             <a:fld id="{1D8BD707-D9CF-40AE-B4C6-C98DA3205C09}" type="datetimeFigureOut">
               <a:rPr lang="en-US" smtClean="0"/>
               <a:pPr/>
-              <a:t>9/25/2015</a:t>
+              <a:t>9/26/2015</a:t>
             </a:fld>
             <a:endParaRPr lang="en-US"/>
           </a:p>
@@ -467,7 +467,7 @@
             <a:fld id="{1D8BD707-D9CF-40AE-B4C6-C98DA3205C09}" type="datetimeFigureOut">
               <a:rPr lang="en-US" smtClean="0"/>
               <a:pPr/>
-              <a:t>9/25/2015</a:t>
+              <a:t>9/26/2015</a:t>
             </a:fld>
             <a:endParaRPr lang="en-US"/>
           </a:p>
@@ -644,7 +644,7 @@
             <a:fld id="{1D8BD707-D9CF-40AE-B4C6-C98DA3205C09}" type="datetimeFigureOut">
               <a:rPr lang="en-US" smtClean="0"/>
               <a:pPr/>
-              <a:t>9/25/2015</a:t>
+              <a:t>9/26/2015</a:t>
             </a:fld>
             <a:endParaRPr lang="en-US"/>
           </a:p>
@@ -811,7 +811,7 @@
             <a:fld id="{1D8BD707-D9CF-40AE-B4C6-C98DA3205C09}" type="datetimeFigureOut">
               <a:rPr lang="en-US" smtClean="0"/>
               <a:pPr/>
-              <a:t>9/25/2015</a:t>
+              <a:t>9/26/2015</a:t>
             </a:fld>
             <a:endParaRPr lang="en-US"/>
           </a:p>
@@ -1054,7 +1054,7 @@
             <a:fld id="{1D8BD707-D9CF-40AE-B4C6-C98DA3205C09}" type="datetimeFigureOut">
               <a:rPr lang="en-US" smtClean="0"/>
               <a:pPr/>
-              <a:t>9/25/2015</a:t>
+              <a:t>9/26/2015</a:t>
             </a:fld>
             <a:endParaRPr lang="en-US"/>
           </a:p>
@@ -1339,7 +1339,7 @@
             <a:fld id="{1D8BD707-D9CF-40AE-B4C6-C98DA3205C09}" type="datetimeFigureOut">
               <a:rPr lang="en-US" smtClean="0"/>
               <a:pPr/>
-              <a:t>9/25/2015</a:t>
+              <a:t>9/26/2015</a:t>
             </a:fld>
             <a:endParaRPr lang="en-US"/>
           </a:p>
@@ -1758,7 +1758,7 @@
             <a:fld id="{1D8BD707-D9CF-40AE-B4C6-C98DA3205C09}" type="datetimeFigureOut">
               <a:rPr lang="en-US" smtClean="0"/>
               <a:pPr/>
-              <a:t>9/25/2015</a:t>
+              <a:t>9/26/2015</a:t>
             </a:fld>
             <a:endParaRPr lang="en-US"/>
           </a:p>
@@ -1873,7 +1873,7 @@
             <a:fld id="{1D8BD707-D9CF-40AE-B4C6-C98DA3205C09}" type="datetimeFigureOut">
               <a:rPr lang="en-US" smtClean="0"/>
               <a:pPr/>
-              <a:t>9/25/2015</a:t>
+              <a:t>9/26/2015</a:t>
             </a:fld>
             <a:endParaRPr lang="en-US"/>
           </a:p>
@@ -1965,7 +1965,7 @@
             <a:fld id="{1D8BD707-D9CF-40AE-B4C6-C98DA3205C09}" type="datetimeFigureOut">
               <a:rPr lang="en-US" smtClean="0"/>
               <a:pPr/>
-              <a:t>9/25/2015</a:t>
+              <a:t>9/26/2015</a:t>
             </a:fld>
             <a:endParaRPr lang="en-US"/>
           </a:p>
@@ -2239,7 +2239,7 @@
             <a:fld id="{1D8BD707-D9CF-40AE-B4C6-C98DA3205C09}" type="datetimeFigureOut">
               <a:rPr lang="en-US" smtClean="0"/>
               <a:pPr/>
-              <a:t>9/25/2015</a:t>
+              <a:t>9/26/2015</a:t>
             </a:fld>
             <a:endParaRPr lang="en-US"/>
           </a:p>
@@ -2489,7 +2489,7 @@
             <a:fld id="{1D8BD707-D9CF-40AE-B4C6-C98DA3205C09}" type="datetimeFigureOut">
               <a:rPr lang="en-US" smtClean="0"/>
               <a:pPr/>
-              <a:t>9/25/2015</a:t>
+              <a:t>9/26/2015</a:t>
             </a:fld>
             <a:endParaRPr lang="en-US"/>
           </a:p>
@@ -2699,7 +2699,7 @@
             <a:fld id="{1D8BD707-D9CF-40AE-B4C6-C98DA3205C09}" type="datetimeFigureOut">
               <a:rPr lang="en-US" smtClean="0"/>
               <a:pPr/>
-              <a:t>9/25/2015</a:t>
+              <a:t>9/26/2015</a:t>
             </a:fld>
             <a:endParaRPr lang="en-US"/>
           </a:p>
@@ -4724,7 +4724,19 @@
           <a:p>
             <a:r>
               <a:rPr lang="en-US" dirty="0" smtClean="0"/>
-              <a:t>	25 / (40 + 10 )  = 0.5</a:t>
+              <a:t>	25 / (40 </a:t>
+            </a:r>
+            <a:r>
+              <a:rPr lang="en-US" dirty="0" smtClean="0"/>
+              <a:t>)  </a:t>
+            </a:r>
+            <a:r>
+              <a:rPr lang="en-US" dirty="0" smtClean="0"/>
+              <a:t>= </a:t>
+            </a:r>
+            <a:r>
+              <a:rPr lang="en-US" dirty="0" smtClean="0"/>
+              <a:t>0.63</a:t>
             </a:r>
             <a:endParaRPr lang="en-US" dirty="0"/>
           </a:p>
@@ -6380,7 +6392,7 @@
         <p:spPr>
           <a:xfrm>
             <a:off x="609600" y="3733800"/>
-            <a:ext cx="6648487" cy="1200329"/>
+            <a:ext cx="6239721" cy="1200329"/>
           </a:xfrm>
           <a:prstGeom prst="rect">
             <a:avLst/>
@@ -6401,16 +6413,33 @@
           <a:p>
             <a:r>
               <a:rPr lang="en-US" dirty="0" smtClean="0"/>
-              <a:t>Attack rate for not attending the fair: 10 / ( 10 + 110 )  = 0.077</a:t>
-            </a:r>
-          </a:p>
-          <a:p>
+              <a:t>Attack rate for not attending the fair: 10 / ( 10 + 110 )  = </a:t>
+            </a:r>
+            <a:r>
+              <a:rPr lang="en-US" dirty="0" smtClean="0"/>
+              <a:t>0.83</a:t>
+            </a:r>
             <a:endParaRPr lang="en-US" dirty="0" smtClean="0"/>
           </a:p>
           <a:p>
-            <a:r>
-              <a:rPr lang="en-US" dirty="0" smtClean="0"/>
-              <a:t>The relative risk is the ratio of these two numbers 0.67 / 0.077 = 8.67</a:t>
+            <a:endParaRPr lang="en-US" dirty="0" smtClean="0"/>
+          </a:p>
+          <a:p>
+            <a:r>
+              <a:rPr lang="en-US" dirty="0" smtClean="0"/>
+              <a:t>The relative risk is the ratio of these two numbers 0.67 / </a:t>
+            </a:r>
+            <a:r>
+              <a:rPr lang="en-US" dirty="0" smtClean="0"/>
+              <a:t>0.83 </a:t>
+            </a:r>
+            <a:r>
+              <a:rPr lang="en-US" dirty="0" smtClean="0"/>
+              <a:t>= </a:t>
+            </a:r>
+            <a:r>
+              <a:rPr lang="en-US" dirty="0" smtClean="0"/>
+              <a:t>8</a:t>
             </a:r>
             <a:endParaRPr lang="en-US" dirty="0"/>
           </a:p>
@@ -6707,7 +6736,11 @@
           <a:p>
             <a:r>
               <a:rPr lang="en-US" dirty="0" smtClean="0"/>
-              <a:t>The odds ratio is 2 / 0.09 = 22.2</a:t>
+              <a:t>The odds ratio is 2 / 0.09 = </a:t>
+            </a:r>
+            <a:r>
+              <a:rPr lang="en-US" dirty="0" smtClean="0"/>
+              <a:t>22</a:t>
             </a:r>
             <a:endParaRPr lang="en-US" dirty="0"/>
           </a:p>

</xml_diff>